<commit_message>
2020-05-06 create my version of presentation slide deck.pptx
</commit_message>
<xml_diff>
--- a/milestones/presentation/presentation slide deck.pptx
+++ b/milestones/presentation/presentation slide deck.pptx
@@ -264,7 +264,7 @@
           <a:p>
             <a:fld id="{A8772C97-20F4-4C81-9859-95A3E31E8BE1}" type="datetimeFigureOut">
               <a:rPr lang="en-US" smtClean="0"/>
-              <a:t>12/3/2019</a:t>
+              <a:t>5/6/2020</a:t>
             </a:fld>
             <a:endParaRPr lang="en-US"/>
           </a:p>
@@ -462,7 +462,7 @@
           <a:p>
             <a:fld id="{A8772C97-20F4-4C81-9859-95A3E31E8BE1}" type="datetimeFigureOut">
               <a:rPr lang="en-US" smtClean="0"/>
-              <a:t>12/3/2019</a:t>
+              <a:t>5/6/2020</a:t>
             </a:fld>
             <a:endParaRPr lang="en-US"/>
           </a:p>
@@ -670,7 +670,7 @@
           <a:p>
             <a:fld id="{A8772C97-20F4-4C81-9859-95A3E31E8BE1}" type="datetimeFigureOut">
               <a:rPr lang="en-US" smtClean="0"/>
-              <a:t>12/3/2019</a:t>
+              <a:t>5/6/2020</a:t>
             </a:fld>
             <a:endParaRPr lang="en-US"/>
           </a:p>
@@ -868,7 +868,7 @@
           <a:p>
             <a:fld id="{A8772C97-20F4-4C81-9859-95A3E31E8BE1}" type="datetimeFigureOut">
               <a:rPr lang="en-US" smtClean="0"/>
-              <a:t>12/3/2019</a:t>
+              <a:t>5/6/2020</a:t>
             </a:fld>
             <a:endParaRPr lang="en-US"/>
           </a:p>
@@ -1143,7 +1143,7 @@
           <a:p>
             <a:fld id="{A8772C97-20F4-4C81-9859-95A3E31E8BE1}" type="datetimeFigureOut">
               <a:rPr lang="en-US" smtClean="0"/>
-              <a:t>12/3/2019</a:t>
+              <a:t>5/6/2020</a:t>
             </a:fld>
             <a:endParaRPr lang="en-US"/>
           </a:p>
@@ -1408,7 +1408,7 @@
           <a:p>
             <a:fld id="{A8772C97-20F4-4C81-9859-95A3E31E8BE1}" type="datetimeFigureOut">
               <a:rPr lang="en-US" smtClean="0"/>
-              <a:t>12/3/2019</a:t>
+              <a:t>5/6/2020</a:t>
             </a:fld>
             <a:endParaRPr lang="en-US"/>
           </a:p>
@@ -1820,7 +1820,7 @@
           <a:p>
             <a:fld id="{A8772C97-20F4-4C81-9859-95A3E31E8BE1}" type="datetimeFigureOut">
               <a:rPr lang="en-US" smtClean="0"/>
-              <a:t>12/3/2019</a:t>
+              <a:t>5/6/2020</a:t>
             </a:fld>
             <a:endParaRPr lang="en-US"/>
           </a:p>
@@ -1961,7 +1961,7 @@
           <a:p>
             <a:fld id="{A8772C97-20F4-4C81-9859-95A3E31E8BE1}" type="datetimeFigureOut">
               <a:rPr lang="en-US" smtClean="0"/>
-              <a:t>12/3/2019</a:t>
+              <a:t>5/6/2020</a:t>
             </a:fld>
             <a:endParaRPr lang="en-US"/>
           </a:p>
@@ -2074,7 +2074,7 @@
           <a:p>
             <a:fld id="{A8772C97-20F4-4C81-9859-95A3E31E8BE1}" type="datetimeFigureOut">
               <a:rPr lang="en-US" smtClean="0"/>
-              <a:t>12/3/2019</a:t>
+              <a:t>5/6/2020</a:t>
             </a:fld>
             <a:endParaRPr lang="en-US"/>
           </a:p>
@@ -2385,7 +2385,7 @@
           <a:p>
             <a:fld id="{A8772C97-20F4-4C81-9859-95A3E31E8BE1}" type="datetimeFigureOut">
               <a:rPr lang="en-US" smtClean="0"/>
-              <a:t>12/3/2019</a:t>
+              <a:t>5/6/2020</a:t>
             </a:fld>
             <a:endParaRPr lang="en-US"/>
           </a:p>
@@ -2673,7 +2673,7 @@
           <a:p>
             <a:fld id="{A8772C97-20F4-4C81-9859-95A3E31E8BE1}" type="datetimeFigureOut">
               <a:rPr lang="en-US" smtClean="0"/>
-              <a:t>12/3/2019</a:t>
+              <a:t>5/6/2020</a:t>
             </a:fld>
             <a:endParaRPr lang="en-US"/>
           </a:p>
@@ -2914,7 +2914,7 @@
           <a:p>
             <a:fld id="{A8772C97-20F4-4C81-9859-95A3E31E8BE1}" type="datetimeFigureOut">
               <a:rPr lang="en-US" smtClean="0"/>
-              <a:t>12/3/2019</a:t>
+              <a:t>5/6/2020</a:t>
             </a:fld>
             <a:endParaRPr lang="en-US"/>
           </a:p>
@@ -3354,7 +3354,7 @@
           <a:p>
             <a:r>
               <a:rPr lang="en-US" dirty="0"/>
-              <a:t>&lt;Your Name&gt;</a:t>
+              <a:t>Candace Moore</a:t>
             </a:r>
           </a:p>
         </p:txBody>
@@ -3382,7 +3382,7 @@
           <a:p>
             <a:r>
               <a:rPr lang="en-US" dirty="0"/>
-              <a:t>(Feel free to apply color &amp; style to your slides)</a:t>
+              <a:t>CS 211 – Data Structures</a:t>
             </a:r>
           </a:p>
         </p:txBody>
@@ -3644,7 +3644,22 @@
           <a:bodyPr/>
           <a:lstStyle/>
           <a:p>
-            <a:endParaRPr lang="en-US"/>
+            <a:r>
+              <a:rPr lang="en-US" dirty="0"/>
+              <a:t>Plan early on paper!!</a:t>
+            </a:r>
+          </a:p>
+          <a:p>
+            <a:r>
+              <a:rPr lang="en-US" dirty="0"/>
+              <a:t>Do plenty of research on available tools</a:t>
+            </a:r>
+          </a:p>
+          <a:p>
+            <a:r>
+              <a:rPr lang="en-US" dirty="0"/>
+              <a:t>Do what makes you passionate, and don’t worry so much about learning objectives</a:t>
+            </a:r>
           </a:p>
         </p:txBody>
       </p:sp>

</xml_diff>